<commit_message>
add presentation with practising
</commit_message>
<xml_diff>
--- a/Prezentace/PGM_algoritmy k procvičení III.pptx
+++ b/Prezentace/PGM_algoritmy k procvičení III.pptx
@@ -865,7 +865,7 @@
             <a:fld id="{B61BEF0D-F0BB-DE4B-95CE-6DB70DBA9567}" type="datetimeFigureOut">
               <a:rPr lang="en-US" dirty="0"/>
               <a:pPr/>
-              <a:t>10/13/2020</a:t>
+              <a:t>10/14/2020</a:t>
             </a:fld>
             <a:endParaRPr lang="en-US" dirty="0"/>
           </a:p>
@@ -1113,7 +1113,7 @@
             <a:fld id="{B61BEF0D-F0BB-DE4B-95CE-6DB70DBA9567}" type="datetimeFigureOut">
               <a:rPr lang="en-US" dirty="0"/>
               <a:pPr/>
-              <a:t>10/13/2020</a:t>
+              <a:t>10/14/2020</a:t>
             </a:fld>
             <a:endParaRPr lang="en-US" dirty="0"/>
           </a:p>
@@ -1424,7 +1424,7 @@
             <a:fld id="{B61BEF0D-F0BB-DE4B-95CE-6DB70DBA9567}" type="datetimeFigureOut">
               <a:rPr lang="en-US" dirty="0"/>
               <a:pPr/>
-              <a:t>10/13/2020</a:t>
+              <a:t>10/14/2020</a:t>
             </a:fld>
             <a:endParaRPr lang="en-US" dirty="0"/>
           </a:p>
@@ -1754,7 +1754,7 @@
             <a:fld id="{B61BEF0D-F0BB-DE4B-95CE-6DB70DBA9567}" type="datetimeFigureOut">
               <a:rPr lang="en-US" dirty="0"/>
               <a:pPr/>
-              <a:t>10/13/2020</a:t>
+              <a:t>10/14/2020</a:t>
             </a:fld>
             <a:endParaRPr lang="en-US" dirty="0"/>
           </a:p>
@@ -2065,7 +2065,7 @@
             <a:fld id="{B61BEF0D-F0BB-DE4B-95CE-6DB70DBA9567}" type="datetimeFigureOut">
               <a:rPr lang="en-US" dirty="0"/>
               <a:pPr/>
-              <a:t>10/13/2020</a:t>
+              <a:t>10/14/2020</a:t>
             </a:fld>
             <a:endParaRPr lang="en-US" dirty="0"/>
           </a:p>
@@ -2455,7 +2455,7 @@
             <a:fld id="{B61BEF0D-F0BB-DE4B-95CE-6DB70DBA9567}" type="datetimeFigureOut">
               <a:rPr lang="en-US" dirty="0"/>
               <a:pPr/>
-              <a:t>10/13/2020</a:t>
+              <a:t>10/14/2020</a:t>
             </a:fld>
             <a:endParaRPr lang="en-US" dirty="0"/>
           </a:p>
@@ -2621,7 +2621,7 @@
           <a:p>
             <a:fld id="{55C6B4A9-1611-4792-9094-5F34BCA07E0B}" type="datetimeFigureOut">
               <a:rPr lang="en-US" dirty="0"/>
-              <a:t>10/13/2020</a:t>
+              <a:t>10/14/2020</a:t>
             </a:fld>
             <a:endParaRPr lang="en-US" dirty="0"/>
           </a:p>
@@ -2797,7 +2797,7 @@
             <a:fld id="{B61BEF0D-F0BB-DE4B-95CE-6DB70DBA9567}" type="datetimeFigureOut">
               <a:rPr lang="en-US" dirty="0"/>
               <a:pPr/>
-              <a:t>10/13/2020</a:t>
+              <a:t>10/14/2020</a:t>
             </a:fld>
             <a:endParaRPr lang="en-US" dirty="0"/>
           </a:p>
@@ -2963,7 +2963,7 @@
           <a:p>
             <a:fld id="{42A54C80-263E-416B-A8E0-580EDEADCBDC}" type="datetimeFigureOut">
               <a:rPr lang="en-US" dirty="0"/>
-              <a:t>10/13/2020</a:t>
+              <a:t>10/14/2020</a:t>
             </a:fld>
             <a:endParaRPr lang="en-US" dirty="0"/>
           </a:p>
@@ -3206,7 +3206,7 @@
             <a:fld id="{B61BEF0D-F0BB-DE4B-95CE-6DB70DBA9567}" type="datetimeFigureOut">
               <a:rPr lang="en-US" dirty="0"/>
               <a:pPr/>
-              <a:t>10/13/2020</a:t>
+              <a:t>10/14/2020</a:t>
             </a:fld>
             <a:endParaRPr lang="en-US" dirty="0"/>
           </a:p>
@@ -3434,7 +3434,7 @@
           <a:p>
             <a:fld id="{42A54C80-263E-416B-A8E0-580EDEADCBDC}" type="datetimeFigureOut">
               <a:rPr lang="en-US" dirty="0"/>
-              <a:t>10/13/2020</a:t>
+              <a:t>10/14/2020</a:t>
             </a:fld>
             <a:endParaRPr lang="en-US" dirty="0"/>
           </a:p>
@@ -3804,7 +3804,7 @@
             <a:fld id="{B61BEF0D-F0BB-DE4B-95CE-6DB70DBA9567}" type="datetimeFigureOut">
               <a:rPr lang="en-US" dirty="0"/>
               <a:pPr/>
-              <a:t>10/13/2020</a:t>
+              <a:t>10/14/2020</a:t>
             </a:fld>
             <a:endParaRPr lang="en-US" dirty="0"/>
           </a:p>
@@ -3924,7 +3924,7 @@
             <a:fld id="{B61BEF0D-F0BB-DE4B-95CE-6DB70DBA9567}" type="datetimeFigureOut">
               <a:rPr lang="en-US" dirty="0"/>
               <a:pPr/>
-              <a:t>10/13/2020</a:t>
+              <a:t>10/14/2020</a:t>
             </a:fld>
             <a:endParaRPr lang="en-US" dirty="0"/>
           </a:p>
@@ -4016,7 +4016,7 @@
             <a:fld id="{B61BEF0D-F0BB-DE4B-95CE-6DB70DBA9567}" type="datetimeFigureOut">
               <a:rPr lang="en-US" dirty="0"/>
               <a:pPr/>
-              <a:t>10/13/2020</a:t>
+              <a:t>10/14/2020</a:t>
             </a:fld>
             <a:endParaRPr lang="en-US" dirty="0"/>
           </a:p>
@@ -4267,7 +4267,7 @@
           <a:p>
             <a:fld id="{42A54C80-263E-416B-A8E0-580EDEADCBDC}" type="datetimeFigureOut">
               <a:rPr lang="en-US" dirty="0"/>
-              <a:t>10/13/2020</a:t>
+              <a:t>10/14/2020</a:t>
             </a:fld>
             <a:endParaRPr lang="en-US" dirty="0"/>
           </a:p>
@@ -4569,7 +4569,7 @@
             <a:fld id="{B61BEF0D-F0BB-DE4B-95CE-6DB70DBA9567}" type="datetimeFigureOut">
               <a:rPr lang="en-US" dirty="0"/>
               <a:pPr/>
-              <a:t>10/13/2020</a:t>
+              <a:t>10/14/2020</a:t>
             </a:fld>
             <a:endParaRPr lang="en-US" dirty="0"/>
           </a:p>
@@ -5267,7 +5267,7 @@
             <a:fld id="{B61BEF0D-F0BB-DE4B-95CE-6DB70DBA9567}" type="datetimeFigureOut">
               <a:rPr lang="en-US" dirty="0"/>
               <a:pPr/>
-              <a:t>10/13/2020</a:t>
+              <a:t>10/14/2020</a:t>
             </a:fld>
             <a:endParaRPr lang="en-US" dirty="0"/>
           </a:p>
@@ -5897,9 +5897,10 @@
           <a:lstStyle/>
           <a:p>
             <a:r>
-              <a:rPr lang="cs-CZ" sz="3400" dirty="0"/>
+              <a:rPr lang="cs-CZ" sz="3400"/>
               <a:t>Tvorba algoritmů – zadání</a:t>
             </a:r>
+            <a:endParaRPr lang="cs-CZ" sz="3400" dirty="0"/>
           </a:p>
         </p:txBody>
       </p:sp>
@@ -5947,7 +5948,7 @@
             </a:pPr>
             <a:r>
               <a:rPr lang="cs-CZ" dirty="0"/>
-              <a:t>Algoritmus, který načte větu a na výstup vypíše počet slov</a:t>
+              <a:t>Algoritmus, který načte větu ukončenou tečkou a vypíše počet slov.</a:t>
             </a:r>
           </a:p>
           <a:p>
@@ -5957,7 +5958,7 @@
             </a:pPr>
             <a:r>
               <a:rPr lang="cs-CZ" dirty="0"/>
-              <a:t>Algoritmus, který rozhodne, zda zadané strany v proměnných a, b, c trojúhelníku tvoří pravoúhlý trojúhelník.</a:t>
+              <a:t>Algoritmus, který rozhodne, zda strany zadané v proměnných a, b, c trojúhelníku tvoří pravoúhlý trojúhelník.</a:t>
             </a:r>
           </a:p>
           <a:p>
@@ -5967,7 +5968,7 @@
             </a:pPr>
             <a:r>
               <a:rPr lang="cs-CZ" dirty="0"/>
-              <a:t>Algoritmus, který určí jak velká musí být válcová nádoba, do které se má vejít určitý objem vody. Na vstup získáme hodnotu poloměr kružnice a potřebný objem.</a:t>
+              <a:t>Algoritmus, který určí jak velká musí být válcová nádoba, do které se má vejít určitý objem vody. Na vstup získáme hodnotu poloměru kružnice a potřebný objem.</a:t>
             </a:r>
           </a:p>
           <a:p>
@@ -6169,31 +6170,35 @@
           </a:p>
         </p:txBody>
       </p:sp>
-      <p:sp>
-        <p:nvSpPr>
-          <p:cNvPr id="4" name="Zástupný obsah 3">
+      <p:pic>
+        <p:nvPicPr>
+          <p:cNvPr id="5" name="Zástupný obsah 4">
             <a:extLst>
               <a:ext uri="{FF2B5EF4-FFF2-40B4-BE49-F238E27FC236}">
-                <a16:creationId xmlns:a16="http://schemas.microsoft.com/office/drawing/2014/main" id="{8B904AB7-46CA-4CE9-A367-F01BA3314EB0}"/>
+                <a16:creationId xmlns:a16="http://schemas.microsoft.com/office/drawing/2014/main" id="{DDD40BEC-F287-4F90-9916-BAA589E02134}"/>
               </a:ext>
             </a:extLst>
           </p:cNvPr>
-          <p:cNvSpPr>
-            <a:spLocks noGrp="1"/>
-          </p:cNvSpPr>
+          <p:cNvPicPr>
+            <a:picLocks noGrp="1" noChangeAspect="1"/>
+          </p:cNvPicPr>
           <p:nvPr>
             <p:ph idx="1"/>
           </p:nvPr>
-        </p:nvSpPr>
-        <p:spPr/>
-        <p:txBody>
-          <a:bodyPr/>
-          <a:lstStyle/>
-          <a:p>
-            <a:endParaRPr lang="cs-CZ"/>
-          </a:p>
-        </p:txBody>
-      </p:sp>
+        </p:nvPicPr>
+        <p:blipFill>
+          <a:blip r:embed="rId2"/>
+          <a:stretch>
+            <a:fillRect/>
+          </a:stretch>
+        </p:blipFill>
+        <p:spPr>
+          <a:xfrm>
+            <a:off x="677334" y="1266141"/>
+            <a:ext cx="7162852" cy="5591859"/>
+          </a:xfrm>
+        </p:spPr>
+      </p:pic>
     </p:spTree>
     <p:extLst>
       <p:ext uri="{BB962C8B-B14F-4D97-AF65-F5344CB8AC3E}">
@@ -6252,31 +6257,35 @@
           </a:p>
         </p:txBody>
       </p:sp>
-      <p:sp>
-        <p:nvSpPr>
-          <p:cNvPr id="4" name="Zástupný obsah 3">
+      <p:pic>
+        <p:nvPicPr>
+          <p:cNvPr id="5" name="Zástupný obsah 4">
             <a:extLst>
               <a:ext uri="{FF2B5EF4-FFF2-40B4-BE49-F238E27FC236}">
-                <a16:creationId xmlns:a16="http://schemas.microsoft.com/office/drawing/2014/main" id="{8B904AB7-46CA-4CE9-A367-F01BA3314EB0}"/>
+                <a16:creationId xmlns:a16="http://schemas.microsoft.com/office/drawing/2014/main" id="{139BBC60-6318-4853-B13A-13AF362BB4DB}"/>
               </a:ext>
             </a:extLst>
           </p:cNvPr>
-          <p:cNvSpPr>
-            <a:spLocks noGrp="1"/>
-          </p:cNvSpPr>
+          <p:cNvPicPr>
+            <a:picLocks noGrp="1" noChangeAspect="1"/>
+          </p:cNvPicPr>
           <p:nvPr>
             <p:ph idx="1"/>
           </p:nvPr>
-        </p:nvSpPr>
-        <p:spPr/>
-        <p:txBody>
-          <a:bodyPr/>
-          <a:lstStyle/>
-          <a:p>
-            <a:endParaRPr lang="cs-CZ"/>
-          </a:p>
-        </p:txBody>
-      </p:sp>
+        </p:nvPicPr>
+        <p:blipFill>
+          <a:blip r:embed="rId2"/>
+          <a:stretch>
+            <a:fillRect/>
+          </a:stretch>
+        </p:blipFill>
+        <p:spPr>
+          <a:xfrm>
+            <a:off x="1079303" y="1274164"/>
+            <a:ext cx="7696330" cy="5583836"/>
+          </a:xfrm>
+        </p:spPr>
+      </p:pic>
     </p:spTree>
     <p:extLst>
       <p:ext uri="{BB962C8B-B14F-4D97-AF65-F5344CB8AC3E}">
@@ -6335,31 +6344,35 @@
           </a:p>
         </p:txBody>
       </p:sp>
-      <p:sp>
-        <p:nvSpPr>
-          <p:cNvPr id="4" name="Zástupný obsah 3">
+      <p:pic>
+        <p:nvPicPr>
+          <p:cNvPr id="5" name="Zástupný obsah 4">
             <a:extLst>
               <a:ext uri="{FF2B5EF4-FFF2-40B4-BE49-F238E27FC236}">
-                <a16:creationId xmlns:a16="http://schemas.microsoft.com/office/drawing/2014/main" id="{8B904AB7-46CA-4CE9-A367-F01BA3314EB0}"/>
+                <a16:creationId xmlns:a16="http://schemas.microsoft.com/office/drawing/2014/main" id="{6318236D-6440-4E87-AA3D-3AAD59A75845}"/>
               </a:ext>
             </a:extLst>
           </p:cNvPr>
-          <p:cNvSpPr>
-            <a:spLocks noGrp="1"/>
-          </p:cNvSpPr>
+          <p:cNvPicPr>
+            <a:picLocks noGrp="1" noChangeAspect="1"/>
+          </p:cNvPicPr>
           <p:nvPr>
             <p:ph idx="1"/>
           </p:nvPr>
-        </p:nvSpPr>
-        <p:spPr/>
-        <p:txBody>
-          <a:bodyPr/>
-          <a:lstStyle/>
-          <a:p>
-            <a:endParaRPr lang="cs-CZ"/>
-          </a:p>
-        </p:txBody>
-      </p:sp>
+        </p:nvPicPr>
+        <p:blipFill>
+          <a:blip r:embed="rId2"/>
+          <a:stretch>
+            <a:fillRect/>
+          </a:stretch>
+        </p:blipFill>
+        <p:spPr>
+          <a:xfrm>
+            <a:off x="3539218" y="609600"/>
+            <a:ext cx="3206356" cy="5859098"/>
+          </a:xfrm>
+        </p:spPr>
+      </p:pic>
     </p:spTree>
     <p:extLst>
       <p:ext uri="{BB962C8B-B14F-4D97-AF65-F5344CB8AC3E}">
@@ -6418,31 +6431,35 @@
           </a:p>
         </p:txBody>
       </p:sp>
-      <p:sp>
-        <p:nvSpPr>
-          <p:cNvPr id="4" name="Zástupný obsah 3">
+      <p:pic>
+        <p:nvPicPr>
+          <p:cNvPr id="5" name="Zástupný obsah 4">
             <a:extLst>
               <a:ext uri="{FF2B5EF4-FFF2-40B4-BE49-F238E27FC236}">
-                <a16:creationId xmlns:a16="http://schemas.microsoft.com/office/drawing/2014/main" id="{8B904AB7-46CA-4CE9-A367-F01BA3314EB0}"/>
+                <a16:creationId xmlns:a16="http://schemas.microsoft.com/office/drawing/2014/main" id="{3320A619-2C08-46D8-8576-6F215350ADE5}"/>
               </a:ext>
             </a:extLst>
           </p:cNvPr>
-          <p:cNvSpPr>
-            <a:spLocks noGrp="1"/>
-          </p:cNvSpPr>
+          <p:cNvPicPr>
+            <a:picLocks noGrp="1" noChangeAspect="1"/>
+          </p:cNvPicPr>
           <p:nvPr>
             <p:ph idx="1"/>
           </p:nvPr>
-        </p:nvSpPr>
-        <p:spPr/>
-        <p:txBody>
-          <a:bodyPr/>
-          <a:lstStyle/>
-          <a:p>
-            <a:endParaRPr lang="cs-CZ"/>
-          </a:p>
-        </p:txBody>
-      </p:sp>
+        </p:nvPicPr>
+        <p:blipFill>
+          <a:blip r:embed="rId2"/>
+          <a:stretch>
+            <a:fillRect/>
+          </a:stretch>
+        </p:blipFill>
+        <p:spPr>
+          <a:xfrm>
+            <a:off x="2513954" y="609600"/>
+            <a:ext cx="6760048" cy="5847153"/>
+          </a:xfrm>
+        </p:spPr>
+      </p:pic>
     </p:spTree>
     <p:extLst>
       <p:ext uri="{BB962C8B-B14F-4D97-AF65-F5344CB8AC3E}">
@@ -6501,31 +6518,35 @@
           </a:p>
         </p:txBody>
       </p:sp>
-      <p:sp>
-        <p:nvSpPr>
-          <p:cNvPr id="4" name="Zástupný obsah 3">
+      <p:pic>
+        <p:nvPicPr>
+          <p:cNvPr id="7" name="Zástupný obsah 6">
             <a:extLst>
               <a:ext uri="{FF2B5EF4-FFF2-40B4-BE49-F238E27FC236}">
-                <a16:creationId xmlns:a16="http://schemas.microsoft.com/office/drawing/2014/main" id="{8B904AB7-46CA-4CE9-A367-F01BA3314EB0}"/>
+                <a16:creationId xmlns:a16="http://schemas.microsoft.com/office/drawing/2014/main" id="{0AC0E854-AE74-4842-942E-D3A90E262C3B}"/>
               </a:ext>
             </a:extLst>
           </p:cNvPr>
-          <p:cNvSpPr>
-            <a:spLocks noGrp="1"/>
-          </p:cNvSpPr>
+          <p:cNvPicPr>
+            <a:picLocks noGrp="1" noChangeAspect="1"/>
+          </p:cNvPicPr>
           <p:nvPr>
             <p:ph idx="1"/>
           </p:nvPr>
-        </p:nvSpPr>
-        <p:spPr/>
-        <p:txBody>
-          <a:bodyPr/>
-          <a:lstStyle/>
-          <a:p>
-            <a:endParaRPr lang="cs-CZ"/>
-          </a:p>
-        </p:txBody>
-      </p:sp>
+        </p:nvPicPr>
+        <p:blipFill>
+          <a:blip r:embed="rId2"/>
+          <a:stretch>
+            <a:fillRect/>
+          </a:stretch>
+        </p:blipFill>
+        <p:spPr>
+          <a:xfrm>
+            <a:off x="3132944" y="536997"/>
+            <a:ext cx="4497049" cy="6039573"/>
+          </a:xfrm>
+        </p:spPr>
+      </p:pic>
     </p:spTree>
     <p:extLst>
       <p:ext uri="{BB962C8B-B14F-4D97-AF65-F5344CB8AC3E}">

</xml_diff>